<commit_message>
[master] added lab 12
</commit_message>
<xml_diff>
--- a/lab_11-linking_state_management_with_networking/lab_11-linking_state_management_with_networking.pptx
+++ b/lab_11-linking_state_management_with_networking/lab_11-linking_state_management_with_networking.pptx
@@ -5,7 +5,7 @@
     <p:sldMasterId id="2147483648" r:id="rId1"/>
   </p:sldMasterIdLst>
   <p:notesMasterIdLst>
-    <p:notesMasterId r:id="rId14"/>
+    <p:notesMasterId r:id="rId13"/>
   </p:notesMasterIdLst>
   <p:sldIdLst>
     <p:sldId id="259" r:id="rId2"/>
@@ -19,7 +19,6 @@
     <p:sldId id="366" r:id="rId10"/>
     <p:sldId id="409" r:id="rId11"/>
     <p:sldId id="406" r:id="rId12"/>
-    <p:sldId id="408" r:id="rId13"/>
   </p:sldIdLst>
   <p:sldSz cx="12192000" cy="6858000"/>
   <p:notesSz cx="6858000" cy="9144000"/>
@@ -3518,144 +3517,6 @@
     <p:extLst>
       <p:ext uri="{BB962C8B-B14F-4D97-AF65-F5344CB8AC3E}">
         <p14:creationId xmlns:p14="http://schemas.microsoft.com/office/powerpoint/2010/main" val="2608999866"/>
-      </p:ext>
-    </p:extLst>
-  </p:cSld>
-  <p:clrMapOvr>
-    <a:masterClrMapping/>
-  </p:clrMapOvr>
-</p:sld>
-</file>
-
-<file path=ppt/slides/slide12.xml><?xml version="1.0" encoding="utf-8"?>
-<p:sld xmlns:a="http://schemas.openxmlformats.org/drawingml/2006/main" xmlns:r="http://schemas.openxmlformats.org/officeDocument/2006/relationships" xmlns:p="http://schemas.openxmlformats.org/presentationml/2006/main">
-  <p:cSld>
-    <p:spTree>
-      <p:nvGrpSpPr>
-        <p:cNvPr id="1" name=""/>
-        <p:cNvGrpSpPr/>
-        <p:nvPr/>
-      </p:nvGrpSpPr>
-      <p:grpSpPr>
-        <a:xfrm>
-          <a:off x="0" y="0"/>
-          <a:ext cx="0" cy="0"/>
-          <a:chOff x="0" y="0"/>
-          <a:chExt cx="0" cy="0"/>
-        </a:xfrm>
-      </p:grpSpPr>
-      <p:sp>
-        <p:nvSpPr>
-          <p:cNvPr id="2" name="Title 1">
-            <a:extLst>
-              <a:ext uri="{FF2B5EF4-FFF2-40B4-BE49-F238E27FC236}">
-                <a16:creationId xmlns:a16="http://schemas.microsoft.com/office/drawing/2014/main" id="{122C1E14-0610-FB4E-BCD3-3BA8CADF9D02}"/>
-              </a:ext>
-            </a:extLst>
-          </p:cNvPr>
-          <p:cNvSpPr>
-            <a:spLocks noGrp="1"/>
-          </p:cNvSpPr>
-          <p:nvPr>
-            <p:ph type="title"/>
-          </p:nvPr>
-        </p:nvSpPr>
-        <p:spPr/>
-        <p:txBody>
-          <a:bodyPr/>
-          <a:lstStyle/>
-          <a:p>
-            <a:r>
-              <a:rPr lang="en-IT" dirty="0"/>
-              <a:t>Outline</a:t>
-            </a:r>
-          </a:p>
-        </p:txBody>
-      </p:sp>
-      <p:sp>
-        <p:nvSpPr>
-          <p:cNvPr id="3" name="Content Placeholder 2">
-            <a:extLst>
-              <a:ext uri="{FF2B5EF4-FFF2-40B4-BE49-F238E27FC236}">
-                <a16:creationId xmlns:a16="http://schemas.microsoft.com/office/drawing/2014/main" id="{8962CCAC-9D70-C543-BBE0-822B6CB5F5CB}"/>
-              </a:ext>
-            </a:extLst>
-          </p:cNvPr>
-          <p:cNvSpPr>
-            <a:spLocks noGrp="1"/>
-          </p:cNvSpPr>
-          <p:nvPr>
-            <p:ph idx="1"/>
-          </p:nvPr>
-        </p:nvSpPr>
-        <p:spPr>
-          <a:xfrm>
-            <a:off x="428172" y="1361167"/>
-            <a:ext cx="11213368" cy="5334907"/>
-          </a:xfrm>
-        </p:spPr>
-        <p:txBody>
-          <a:bodyPr>
-            <a:normAutofit/>
-          </a:bodyPr>
-          <a:lstStyle/>
-          <a:p>
-            <a:r>
-              <a:rPr lang="en-GB" dirty="0">
-                <a:solidFill>
-                  <a:schemeClr val="bg2">
-                    <a:lumMod val="90000"/>
-                  </a:schemeClr>
-                </a:solidFill>
-              </a:rPr>
-              <a:t>Recap</a:t>
-            </a:r>
-          </a:p>
-          <a:p>
-            <a:r>
-              <a:rPr lang="en-GB" dirty="0">
-                <a:solidFill>
-                  <a:schemeClr val="bg2">
-                    <a:lumMod val="90000"/>
-                  </a:schemeClr>
-                </a:solidFill>
-              </a:rPr>
-              <a:t>Linking state management with networking</a:t>
-            </a:r>
-          </a:p>
-          <a:p>
-            <a:endParaRPr lang="en-GB" dirty="0">
-              <a:solidFill>
-                <a:schemeClr val="bg2">
-                  <a:lumMod val="90000"/>
-                </a:schemeClr>
-              </a:solidFill>
-            </a:endParaRPr>
-          </a:p>
-          <a:p>
-            <a:r>
-              <a:rPr lang="en-GB" dirty="0">
-                <a:solidFill>
-                  <a:schemeClr val="bg2">
-                    <a:lumMod val="90000"/>
-                  </a:schemeClr>
-                </a:solidFill>
-              </a:rPr>
-              <a:t>Exercise</a:t>
-            </a:r>
-          </a:p>
-          <a:p>
-            <a:pPr marL="0" indent="0">
-              <a:buNone/>
-            </a:pPr>
-            <a:endParaRPr lang="en-GB" dirty="0"/>
-          </a:p>
-        </p:txBody>
-      </p:sp>
-    </p:spTree>
-    <p:extLst>
-      <p:ext uri="{BB962C8B-B14F-4D97-AF65-F5344CB8AC3E}">
-        <p14:creationId xmlns:p14="http://schemas.microsoft.com/office/powerpoint/2010/main" val="2309796671"/>
       </p:ext>
     </p:extLst>
   </p:cSld>

</xml_diff>